<commit_message>
Minor fixes on abstract classes and interfaces basics slides
</commit_message>
<xml_diff>
--- a/Courses/Software-Sciences/Module-1-OOP/10.1-Abstract-Classes-and-Interfaces-Basics/10.1-Abstract-Classes-and-Interfaces-Basics.pptx
+++ b/Courses/Software-Sciences/Module-1-OOP/10.1-Abstract-Classes-and-Interfaces-Basics/10.1-Abstract-Classes-and-Interfaces-Basics.pptx
@@ -278,7 +278,7 @@
             </a:lvl1pPr>
           </a:lstStyle>
           <a:p>
-            <a:endParaRPr lang="bg-BG"/>
+            <a:endParaRPr lang="bg-BG" dirty="0"/>
           </a:p>
         </p:txBody>
       </p:sp>
@@ -317,9 +317,9 @@
           <a:p>
             <a:fld id="{4E087215-0C8F-4762-A664-737A353EC9A4}" type="datetimeFigureOut">
               <a:rPr lang="bg-BG" smtClean="0"/>
-              <a:t>18.01.23 г.</a:t>
+              <a:t>17.05.23 г.</a:t>
             </a:fld>
-            <a:endParaRPr lang="bg-BG"/>
+            <a:endParaRPr lang="bg-BG" dirty="0"/>
           </a:p>
         </p:txBody>
       </p:sp>
@@ -475,7 +475,7 @@
             </a:lvl1pPr>
           </a:lstStyle>
           <a:p>
-            <a:endParaRPr lang="en-US"/>
+            <a:endParaRPr lang="en-US" dirty="0"/>
           </a:p>
         </p:txBody>
       </p:sp>
@@ -508,9 +508,9 @@
           <a:p>
             <a:fld id="{72D84649-876A-46C9-8472-14CB09C070D8}" type="datetimeFigureOut">
               <a:rPr lang="en-US" smtClean="0"/>
-              <a:t>1/18/23</a:t>
+              <a:t>5/17/23</a:t>
             </a:fld>
-            <a:endParaRPr lang="en-US"/>
+            <a:endParaRPr lang="en-US" dirty="0"/>
           </a:p>
         </p:txBody>
       </p:sp>
@@ -543,7 +543,7 @@
           <a:bodyPr vert="horz" lIns="91440" tIns="45720" rIns="91440" bIns="45720" rtlCol="0" anchor="ctr"/>
           <a:lstStyle/>
           <a:p>
-            <a:endParaRPr lang="en-US"/>
+            <a:endParaRPr lang="en-US" dirty="0"/>
           </a:p>
         </p:txBody>
       </p:sp>
@@ -2054,7 +2054,7 @@
           <a:bodyPr/>
           <a:lstStyle/>
           <a:p>
-            <a:endParaRPr lang="en-US"/>
+            <a:endParaRPr lang="en-US" dirty="0"/>
           </a:p>
         </p:txBody>
       </p:sp>
@@ -2189,7 +2189,7 @@
           <a:bodyPr/>
           <a:lstStyle/>
           <a:p>
-            <a:endParaRPr lang="en-US"/>
+            <a:endParaRPr lang="en-US" dirty="0"/>
           </a:p>
         </p:txBody>
       </p:sp>
@@ -2565,7 +2565,7 @@
           <a:bodyPr/>
           <a:lstStyle/>
           <a:p>
-            <a:endParaRPr lang="en-US"/>
+            <a:endParaRPr lang="en-US" dirty="0"/>
           </a:p>
         </p:txBody>
       </p:sp>
@@ -3788,7 +3788,7 @@
               <a:tabLst/>
               <a:defRPr/>
             </a:pPr>
-            <a:endParaRPr kumimoji="0" lang="en-US" altLang="ko-KR" sz="2398" b="0" i="0" u="none" strike="noStrike" kern="1200" cap="none" spc="0" normalizeH="0" baseline="0" noProof="0">
+            <a:endParaRPr kumimoji="0" lang="en-US" altLang="ko-KR" sz="2398" b="0" i="0" u="none" strike="noStrike" kern="1200" cap="none" spc="0" normalizeH="0" baseline="0" noProof="0" dirty="0">
               <a:ln>
                 <a:noFill/>
               </a:ln>
@@ -4417,7 +4417,7 @@
               <a:tabLst/>
               <a:defRPr/>
             </a:pPr>
-            <a:endParaRPr kumimoji="0" lang="en-US" altLang="ko-KR" sz="2398" b="0" i="0" u="none" strike="noStrike" kern="1200" cap="none" spc="0" normalizeH="0" baseline="0" noProof="0">
+            <a:endParaRPr kumimoji="0" lang="en-US" altLang="ko-KR" sz="2398" b="0" i="0" u="none" strike="noStrike" kern="1200" cap="none" spc="0" normalizeH="0" baseline="0" noProof="0" dirty="0">
               <a:ln>
                 <a:noFill/>
               </a:ln>
@@ -4540,7 +4540,7 @@
               <a:tabLst/>
               <a:defRPr/>
             </a:pPr>
-            <a:endParaRPr kumimoji="0" lang="en-US" altLang="ko-KR" sz="2398" b="0" i="0" u="none" strike="noStrike" kern="1200" cap="none" spc="0" normalizeH="0" baseline="0" noProof="0">
+            <a:endParaRPr kumimoji="0" lang="en-US" altLang="ko-KR" sz="2398" b="0" i="0" u="none" strike="noStrike" kern="1200" cap="none" spc="0" normalizeH="0" baseline="0" noProof="0" dirty="0">
               <a:ln>
                 <a:noFill/>
               </a:ln>
@@ -4813,7 +4813,7 @@
               <a:tabLst/>
               <a:defRPr/>
             </a:pPr>
-            <a:endParaRPr kumimoji="0" lang="en-US" altLang="ko-KR" sz="2398" b="0" i="0" u="none" strike="noStrike" kern="1200" cap="none" spc="0" normalizeH="0" baseline="0" noProof="0">
+            <a:endParaRPr kumimoji="0" lang="en-US" altLang="ko-KR" sz="2398" b="0" i="0" u="none" strike="noStrike" kern="1200" cap="none" spc="0" normalizeH="0" baseline="0" noProof="0" dirty="0">
               <a:ln>
                 <a:noFill/>
               </a:ln>
@@ -4999,7 +4999,7 @@
               <a:pPr/>
               <a:t>‹#›</a:t>
             </a:fld>
-            <a:endParaRPr lang="en-US" noProof="0"/>
+            <a:endParaRPr lang="en-US" noProof="0" dirty="0"/>
           </a:p>
         </p:txBody>
       </p:sp>
@@ -5153,7 +5153,7 @@
           </a:lstStyle>
           <a:p>
             <a:r>
-              <a:rPr lang="en-US" altLang="ko-KR" noProof="0"/>
+              <a:rPr lang="en-US" altLang="ko-KR" noProof="0" dirty="0"/>
               <a:t>Your Picture Here</a:t>
             </a:r>
           </a:p>
@@ -5217,7 +5217,7 @@
               <a:tabLst/>
               <a:defRPr/>
             </a:pPr>
-            <a:endParaRPr kumimoji="0" lang="en-US" altLang="ko-KR" sz="2398" b="0" i="0" u="none" strike="noStrike" kern="1200" cap="none" spc="0" normalizeH="0" baseline="0" noProof="0">
+            <a:endParaRPr kumimoji="0" lang="en-US" altLang="ko-KR" sz="2398" b="0" i="0" u="none" strike="noStrike" kern="1200" cap="none" spc="0" normalizeH="0" baseline="0" noProof="0" dirty="0">
               <a:ln>
                 <a:noFill/>
               </a:ln>
@@ -5292,7 +5292,7 @@
               <a:tabLst/>
               <a:defRPr/>
             </a:pPr>
-            <a:endParaRPr kumimoji="0" lang="en-US" altLang="ko-KR" sz="2398" b="0" i="0" u="none" strike="noStrike" kern="1200" cap="none" spc="0" normalizeH="0" baseline="0" noProof="0">
+            <a:endParaRPr kumimoji="0" lang="en-US" altLang="ko-KR" sz="2398" b="0" i="0" u="none" strike="noStrike" kern="1200" cap="none" spc="0" normalizeH="0" baseline="0" noProof="0" dirty="0">
               <a:ln>
                 <a:noFill/>
               </a:ln>
@@ -5373,7 +5373,7 @@
               <a:tabLst/>
               <a:defRPr/>
             </a:pPr>
-            <a:endParaRPr kumimoji="0" lang="en-US" altLang="ko-KR" sz="2398" b="0" i="0" u="none" strike="noStrike" kern="1200" cap="none" spc="0" normalizeH="0" baseline="0" noProof="0">
+            <a:endParaRPr kumimoji="0" lang="en-US" altLang="ko-KR" sz="2398" b="0" i="0" u="none" strike="noStrike" kern="1200" cap="none" spc="0" normalizeH="0" baseline="0" noProof="0" dirty="0">
               <a:ln>
                 <a:noFill/>
               </a:ln>
@@ -5454,7 +5454,7 @@
               <a:tabLst/>
               <a:defRPr/>
             </a:pPr>
-            <a:endParaRPr kumimoji="0" lang="en-US" altLang="ko-KR" sz="2398" b="0" i="0" u="none" strike="noStrike" kern="1200" cap="none" spc="0" normalizeH="0" baseline="0" noProof="0">
+            <a:endParaRPr kumimoji="0" lang="en-US" altLang="ko-KR" sz="2398" b="0" i="0" u="none" strike="noStrike" kern="1200" cap="none" spc="0" normalizeH="0" baseline="0" noProof="0" dirty="0">
               <a:ln>
                 <a:noFill/>
               </a:ln>
@@ -5658,7 +5658,7 @@
               <a:tabLst/>
               <a:defRPr/>
             </a:pPr>
-            <a:endParaRPr kumimoji="0" lang="en-US" altLang="ko-KR" sz="2398" b="0" i="0" u="none" strike="noStrike" kern="1200" cap="none" spc="0" normalizeH="0" baseline="0" noProof="0">
+            <a:endParaRPr kumimoji="0" lang="en-US" altLang="ko-KR" sz="2398" b="0" i="0" u="none" strike="noStrike" kern="1200" cap="none" spc="0" normalizeH="0" baseline="0" noProof="0" dirty="0">
               <a:ln>
                 <a:noFill/>
               </a:ln>
@@ -7164,7 +7164,7 @@
               <a:tabLst/>
               <a:defRPr/>
             </a:pPr>
-            <a:endParaRPr kumimoji="0" lang="en-US" altLang="ko-KR" sz="2398" b="0" i="0" u="none" strike="noStrike" kern="1200" cap="none" spc="0" normalizeH="0" baseline="0" noProof="0">
+            <a:endParaRPr kumimoji="0" lang="en-US" altLang="ko-KR" sz="2398" b="0" i="0" u="none" strike="noStrike" kern="1200" cap="none" spc="0" normalizeH="0" baseline="0" noProof="0" dirty="0">
               <a:ln>
                 <a:noFill/>
               </a:ln>
@@ -7492,7 +7492,7 @@
               <a:tabLst/>
               <a:defRPr/>
             </a:pPr>
-            <a:endParaRPr kumimoji="0" lang="en-US" altLang="ko-KR" sz="2398" b="0" i="0" u="none" strike="noStrike" kern="1200" cap="none" spc="0" normalizeH="0" baseline="0" noProof="0">
+            <a:endParaRPr kumimoji="0" lang="en-US" altLang="ko-KR" sz="2398" b="0" i="0" u="none" strike="noStrike" kern="1200" cap="none" spc="0" normalizeH="0" baseline="0" noProof="0" dirty="0">
               <a:ln>
                 <a:noFill/>
               </a:ln>
@@ -7662,7 +7662,7 @@
               <a:pPr/>
               <a:t>‹#›</a:t>
             </a:fld>
-            <a:endParaRPr lang="en-US" noProof="0"/>
+            <a:endParaRPr lang="en-US" noProof="0" dirty="0"/>
           </a:p>
         </p:txBody>
       </p:sp>
@@ -7857,7 +7857,7 @@
               <a:tabLst/>
               <a:defRPr/>
             </a:pPr>
-            <a:endParaRPr kumimoji="0" lang="en-US" altLang="ko-KR" sz="2398" b="0" i="0" u="none" strike="noStrike" kern="1200" cap="none" spc="0" normalizeH="0" baseline="0" noProof="0">
+            <a:endParaRPr kumimoji="0" lang="en-US" altLang="ko-KR" sz="2398" b="0" i="0" u="none" strike="noStrike" kern="1200" cap="none" spc="0" normalizeH="0" baseline="0" noProof="0" dirty="0">
               <a:ln>
                 <a:noFill/>
               </a:ln>
@@ -9118,7 +9118,7 @@
               <a:pPr/>
               <a:t>‹#›</a:t>
             </a:fld>
-            <a:endParaRPr lang="en-US" noProof="0"/>
+            <a:endParaRPr lang="en-US" noProof="0" dirty="0"/>
           </a:p>
         </p:txBody>
       </p:sp>
@@ -9186,7 +9186,7 @@
               <a:tabLst/>
               <a:defRPr/>
             </a:pPr>
-            <a:endParaRPr kumimoji="0" lang="en-US" altLang="ko-KR" sz="2398" b="0" i="0" u="none" strike="noStrike" kern="1200" cap="none" spc="0" normalizeH="0" baseline="0" noProof="0">
+            <a:endParaRPr kumimoji="0" lang="en-US" altLang="ko-KR" sz="2398" b="0" i="0" u="none" strike="noStrike" kern="1200" cap="none" spc="0" normalizeH="0" baseline="0" noProof="0" dirty="0">
               <a:ln>
                 <a:noFill/>
               </a:ln>
@@ -9554,7 +9554,7 @@
               <a:tabLst/>
               <a:defRPr/>
             </a:pPr>
-            <a:endParaRPr kumimoji="0" lang="en-US" altLang="ko-KR" sz="2398" b="0" i="0" u="none" strike="noStrike" kern="1200" cap="none" spc="0" normalizeH="0" baseline="0" noProof="0">
+            <a:endParaRPr kumimoji="0" lang="en-US" altLang="ko-KR" sz="2398" b="0" i="0" u="none" strike="noStrike" kern="1200" cap="none" spc="0" normalizeH="0" baseline="0" noProof="0" dirty="0">
               <a:ln>
                 <a:noFill/>
               </a:ln>
@@ -10206,7 +10206,7 @@
           <a:lstStyle/>
           <a:p>
             <a:r>
-              <a:rPr lang="en-US">
+              <a:rPr lang="en-US" dirty="0">
                 <a:hlinkClick r:id="rId3"/>
               </a:rPr>
               <a:t>https://softuni.bg</a:t>
@@ -10320,7 +10320,7 @@
               <a:t> </a:t>
             </a:r>
             <a:r>
-              <a:rPr lang="bg-BG" dirty="0" err="1"/>
+              <a:rPr lang="bg-BG" dirty="0"/>
               <a:t>енкапсулация</a:t>
             </a:r>
             <a:br>
@@ -14772,20 +14772,12 @@
               <a:t> </a:t>
             </a:r>
             <a:r>
-              <a:rPr lang="bg-BG" sz="3000" b="1" dirty="0" err="1">
+              <a:rPr lang="bg-BG" sz="3000" b="1" dirty="0">
                 <a:solidFill>
                   <a:schemeClr val="bg1"/>
                 </a:solidFill>
               </a:rPr>
-              <a:t>рисуваеми</a:t>
-            </a:r>
-            <a:r>
-              <a:rPr lang="bg-BG" sz="3000" b="1" dirty="0">
-                <a:solidFill>
-                  <a:schemeClr val="bg1"/>
-                </a:solidFill>
-              </a:rPr>
-              <a:t> обекти</a:t>
+              <a:t>рисуваеми обекти</a:t>
             </a:r>
             <a:endParaRPr lang="en-US" sz="3000" b="1" dirty="0">
               <a:solidFill>
@@ -17769,7 +17761,7 @@
             <a:pPr algn="ctr"/>
             <a:r>
               <a:rPr lang="bg-BG" dirty="0"/>
-              <a:t>Проверете решението си тук </a:t>
+              <a:t>Проверете решението си тук</a:t>
             </a:r>
             <a:r>
               <a:rPr lang="en-US" dirty="0"/>
@@ -17779,7 +17771,7 @@
               <a:rPr lang="en-US" dirty="0">
                 <a:hlinkClick r:id="rId3"/>
               </a:rPr>
-              <a:t>https://judge.softuni.bg/Contests/Practice/Index/3165#0</a:t>
+              <a:t>https://judge.softuni.org/Contests/Practice/Index/4066#0</a:t>
             </a:r>
             <a:endParaRPr lang="en-US" dirty="0"/>
           </a:p>
@@ -19039,6 +19031,9 @@
               <a:rPr lang="bg-BG" sz="2800" dirty="0"/>
               <a:t>и </a:t>
             </a:r>
+            <a:br>
+              <a:rPr lang="en-US" sz="2800" dirty="0"/>
+            </a:br>
             <a:r>
               <a:rPr lang="en-US" sz="2800" b="1" dirty="0">
                 <a:solidFill>
@@ -20577,15 +20572,7 @@
                   <a:srgbClr val="FFFFFF"/>
                 </a:solidFill>
               </a:rPr>
-              <a:t>да бъде </a:t>
-            </a:r>
-            <a:r>
-              <a:rPr lang="bg-BG" sz="2400" b="1" dirty="0" err="1">
-                <a:solidFill>
-                  <a:srgbClr val="FFFFFF"/>
-                </a:solidFill>
-              </a:rPr>
-              <a:t>инстанциран</a:t>
+              <a:t>да бъде инстанцииран</a:t>
             </a:r>
             <a:endParaRPr lang="en-US" sz="2400" b="1" dirty="0">
               <a:solidFill>
@@ -25603,17 +25590,17 @@
                 <a:latin typeface="Consolas" pitchFamily="49" charset="0"/>
                 <a:cs typeface="Consolas" pitchFamily="49" charset="0"/>
               </a:rPr>
-              <a:t>TODO: </a:t>
-            </a:r>
-            <a:r>
-              <a:rPr lang="en-US" sz="2600" b="1" i="1" noProof="1">
+              <a:t>TODO:</a:t>
+            </a:r>
+            <a:r>
+              <a:rPr lang="bg-BG" sz="2600" b="1" noProof="1">
                 <a:solidFill>
                   <a:schemeClr val="accent2"/>
                 </a:solidFill>
                 <a:latin typeface="Consolas" pitchFamily="49" charset="0"/>
                 <a:cs typeface="Consolas" pitchFamily="49" charset="0"/>
               </a:rPr>
-              <a:t>Add Logic here </a:t>
+              <a:t> добавете логиката </a:t>
             </a:r>
             <a:r>
               <a:rPr lang="en-US" sz="2600" b="1" noProof="1">
@@ -25684,7 +25671,17 @@
                 <a:latin typeface="Consolas" pitchFamily="49" charset="0"/>
                 <a:cs typeface="Consolas" pitchFamily="49" charset="0"/>
               </a:rPr>
-              <a:t> Add Logic here </a:t>
+              <a:t> </a:t>
+            </a:r>
+            <a:r>
+              <a:rPr lang="bg-BG" sz="2600" b="1" noProof="1">
+                <a:solidFill>
+                  <a:schemeClr val="accent2"/>
+                </a:solidFill>
+                <a:latin typeface="Consolas" pitchFamily="49" charset="0"/>
+                <a:cs typeface="Consolas" pitchFamily="49" charset="0"/>
+              </a:rPr>
+              <a:t>добавете логиката </a:t>
             </a:r>
             <a:r>
               <a:rPr lang="en-US" sz="2600" b="1" noProof="1">
@@ -25755,7 +25752,17 @@
                 <a:latin typeface="Consolas" pitchFamily="49" charset="0"/>
                 <a:cs typeface="Consolas" pitchFamily="49" charset="0"/>
               </a:rPr>
-              <a:t> Add Logic here </a:t>
+              <a:t> </a:t>
+            </a:r>
+            <a:r>
+              <a:rPr lang="bg-BG" sz="2600" b="1" noProof="1">
+                <a:solidFill>
+                  <a:schemeClr val="accent2"/>
+                </a:solidFill>
+                <a:latin typeface="Consolas" pitchFamily="49" charset="0"/>
+                <a:cs typeface="Consolas" pitchFamily="49" charset="0"/>
+              </a:rPr>
+              <a:t>добавете логиката </a:t>
             </a:r>
             <a:r>
               <a:rPr lang="en-US" sz="2600" b="1" noProof="1">
@@ -26391,16 +26398,12 @@
               <a:t>: </a:t>
             </a:r>
             <a:r>
-              <a:rPr lang="bg-BG"/>
+              <a:rPr lang="bg-BG" dirty="0"/>
               <a:t>Коли</a:t>
             </a:r>
             <a:r>
-              <a:rPr lang="en-US"/>
-              <a:t> </a:t>
-            </a:r>
-            <a:r>
               <a:rPr lang="en-US" dirty="0"/>
-              <a:t>(3)</a:t>
+              <a:t> (3)</a:t>
             </a:r>
           </a:p>
         </p:txBody>
@@ -26979,7 +26982,7 @@
               <a:rPr lang="en-US" dirty="0">
                 <a:hlinkClick r:id="rId3"/>
               </a:rPr>
-              <a:t>https://judge.softuni.bg/Contests/Practice/Index/3165#1</a:t>
+              <a:t>https://judge.softuni.org/Contests/Practice/Index/4066#1</a:t>
             </a:r>
             <a:endParaRPr lang="en-US" dirty="0"/>
           </a:p>
@@ -27721,7 +27724,7 @@
             <a:lstStyle/>
             <a:p>
               <a:pPr algn="ctr"/>
-              <a:endParaRPr lang="ko-KR" altLang="en-US" sz="2399">
+              <a:endParaRPr lang="ko-KR" altLang="en-US" sz="2399" dirty="0">
                 <a:solidFill>
                   <a:schemeClr val="bg1"/>
                 </a:solidFill>
@@ -27782,7 +27785,7 @@
             <a:lstStyle/>
             <a:p>
               <a:pPr algn="ctr"/>
-              <a:endParaRPr lang="ko-KR" altLang="en-US" sz="2399">
+              <a:endParaRPr lang="ko-KR" altLang="en-US" sz="2399" dirty="0">
                 <a:solidFill>
                   <a:schemeClr val="tx1"/>
                 </a:solidFill>
@@ -28698,7 +28701,7 @@
               <a:t>© </a:t>
             </a:r>
             <a:r>
-              <a:rPr lang="bg-BG" dirty="0" err="1"/>
+              <a:rPr lang="bg-BG" dirty="0"/>
               <a:t>СофтУни</a:t>
             </a:r>
             <a:r>
@@ -30230,7 +30233,7 @@
           <a:lstStyle/>
           <a:p>
             <a:r>
-              <a:rPr lang="bg-BG" sz="3000" dirty="0" err="1"/>
+              <a:rPr lang="bg-BG" sz="3000" dirty="0"/>
               <a:t>Енкапсулация</a:t>
             </a:r>
             <a:endParaRPr lang="en-GB" sz="3000" dirty="0"/>
@@ -30481,7 +30484,7 @@
               <a:t> </a:t>
             </a:r>
             <a:r>
-              <a:rPr lang="bg-BG" dirty="0" err="1"/>
+              <a:rPr lang="bg-BG" dirty="0"/>
               <a:t>енкапсулация</a:t>
             </a:r>
             <a:endParaRPr lang="en-GB" dirty="0"/>

</xml_diff>